<commit_message>
Just backing up recent progress.
</commit_message>
<xml_diff>
--- a/Figures/ch6Figures/SomeCh6Figures.pptx
+++ b/Figures/ch6Figures/SomeCh6Figures.pptx
@@ -194,7 +194,7 @@
           <a:p>
             <a:fld id="{1EAC2CEE-5F46-5F4D-A743-2326851CE533}" type="datetimeFigureOut">
               <a:rPr lang="en-US" smtClean="0"/>
-              <a:t>12/16/16</a:t>
+              <a:t>4/2/17</a:t>
             </a:fld>
             <a:endParaRPr lang="en-US"/>
           </a:p>
@@ -819,7 +819,7 @@
           <a:p>
             <a:fld id="{85257AAD-97C7-8E4A-AE15-4CB2A0965900}" type="datetimeFigureOut">
               <a:rPr lang="en-US" smtClean="0"/>
-              <a:t>12/16/16</a:t>
+              <a:t>4/2/17</a:t>
             </a:fld>
             <a:endParaRPr lang="en-US"/>
           </a:p>
@@ -989,7 +989,7 @@
           <a:p>
             <a:fld id="{85257AAD-97C7-8E4A-AE15-4CB2A0965900}" type="datetimeFigureOut">
               <a:rPr lang="en-US" smtClean="0"/>
-              <a:t>12/16/16</a:t>
+              <a:t>4/2/17</a:t>
             </a:fld>
             <a:endParaRPr lang="en-US"/>
           </a:p>
@@ -1169,7 +1169,7 @@
           <a:p>
             <a:fld id="{85257AAD-97C7-8E4A-AE15-4CB2A0965900}" type="datetimeFigureOut">
               <a:rPr lang="en-US" smtClean="0"/>
-              <a:t>12/16/16</a:t>
+              <a:t>4/2/17</a:t>
             </a:fld>
             <a:endParaRPr lang="en-US"/>
           </a:p>
@@ -1339,7 +1339,7 @@
           <a:p>
             <a:fld id="{85257AAD-97C7-8E4A-AE15-4CB2A0965900}" type="datetimeFigureOut">
               <a:rPr lang="en-US" smtClean="0"/>
-              <a:t>12/16/16</a:t>
+              <a:t>4/2/17</a:t>
             </a:fld>
             <a:endParaRPr lang="en-US"/>
           </a:p>
@@ -1585,7 +1585,7 @@
           <a:p>
             <a:fld id="{85257AAD-97C7-8E4A-AE15-4CB2A0965900}" type="datetimeFigureOut">
               <a:rPr lang="en-US" smtClean="0"/>
-              <a:t>12/16/16</a:t>
+              <a:t>4/2/17</a:t>
             </a:fld>
             <a:endParaRPr lang="en-US"/>
           </a:p>
@@ -1873,7 +1873,7 @@
           <a:p>
             <a:fld id="{85257AAD-97C7-8E4A-AE15-4CB2A0965900}" type="datetimeFigureOut">
               <a:rPr lang="en-US" smtClean="0"/>
-              <a:t>12/16/16</a:t>
+              <a:t>4/2/17</a:t>
             </a:fld>
             <a:endParaRPr lang="en-US"/>
           </a:p>
@@ -2295,7 +2295,7 @@
           <a:p>
             <a:fld id="{85257AAD-97C7-8E4A-AE15-4CB2A0965900}" type="datetimeFigureOut">
               <a:rPr lang="en-US" smtClean="0"/>
-              <a:t>12/16/16</a:t>
+              <a:t>4/2/17</a:t>
             </a:fld>
             <a:endParaRPr lang="en-US"/>
           </a:p>
@@ -2413,7 +2413,7 @@
           <a:p>
             <a:fld id="{85257AAD-97C7-8E4A-AE15-4CB2A0965900}" type="datetimeFigureOut">
               <a:rPr lang="en-US" smtClean="0"/>
-              <a:t>12/16/16</a:t>
+              <a:t>4/2/17</a:t>
             </a:fld>
             <a:endParaRPr lang="en-US"/>
           </a:p>
@@ -2508,7 +2508,7 @@
           <a:p>
             <a:fld id="{85257AAD-97C7-8E4A-AE15-4CB2A0965900}" type="datetimeFigureOut">
               <a:rPr lang="en-US" smtClean="0"/>
-              <a:t>12/16/16</a:t>
+              <a:t>4/2/17</a:t>
             </a:fld>
             <a:endParaRPr lang="en-US"/>
           </a:p>
@@ -2785,7 +2785,7 @@
           <a:p>
             <a:fld id="{85257AAD-97C7-8E4A-AE15-4CB2A0965900}" type="datetimeFigureOut">
               <a:rPr lang="en-US" smtClean="0"/>
-              <a:t>12/16/16</a:t>
+              <a:t>4/2/17</a:t>
             </a:fld>
             <a:endParaRPr lang="en-US"/>
           </a:p>
@@ -3038,7 +3038,7 @@
           <a:p>
             <a:fld id="{85257AAD-97C7-8E4A-AE15-4CB2A0965900}" type="datetimeFigureOut">
               <a:rPr lang="en-US" smtClean="0"/>
-              <a:t>12/16/16</a:t>
+              <a:t>4/2/17</a:t>
             </a:fld>
             <a:endParaRPr lang="en-US"/>
           </a:p>
@@ -3251,7 +3251,7 @@
           <a:p>
             <a:fld id="{85257AAD-97C7-8E4A-AE15-4CB2A0965900}" type="datetimeFigureOut">
               <a:rPr lang="en-US" smtClean="0"/>
-              <a:t>12/16/16</a:t>
+              <a:t>4/2/17</a:t>
             </a:fld>
             <a:endParaRPr lang="en-US"/>
           </a:p>
@@ -5873,12 +5873,32 @@
           <a:lstStyle/>
           <a:p>
             <a:r>
-              <a:rPr lang="en-US" dirty="0"/>
-              <a:t>2</a:t>
-            </a:r>
-            <a:r>
               <a:rPr lang="en-US" dirty="0" smtClean="0"/>
-              <a:t> Rotor Diameters (252 m)</a:t>
+              <a:t>1.5</a:t>
+            </a:r>
+            <a:r>
+              <a:rPr lang="en-US" dirty="0" smtClean="0"/>
+              <a:t> </a:t>
+            </a:r>
+            <a:r>
+              <a:rPr lang="en-US" dirty="0" smtClean="0"/>
+              <a:t>Rotor Diameters </a:t>
+            </a:r>
+            <a:r>
+              <a:rPr lang="en-US" dirty="0" smtClean="0"/>
+              <a:t>(</a:t>
+            </a:r>
+            <a:r>
+              <a:rPr lang="en-US" dirty="0" smtClean="0"/>
+              <a:t>189</a:t>
+            </a:r>
+            <a:r>
+              <a:rPr lang="en-US" dirty="0" smtClean="0"/>
+              <a:t> </a:t>
+            </a:r>
+            <a:r>
+              <a:rPr lang="en-US" dirty="0" smtClean="0"/>
+              <a:t>m)</a:t>
             </a:r>
             <a:endParaRPr lang="en-US" dirty="0"/>
           </a:p>

</xml_diff>

<commit_message>
Backup of recent work.
</commit_message>
<xml_diff>
--- a/Figures/ch6Figures/SomeCh6Figures.pptx
+++ b/Figures/ch6Figures/SomeCh6Figures.pptx
@@ -5,12 +5,14 @@
     <p:sldMasterId id="2147483648" r:id="rId1"/>
   </p:sldMasterIdLst>
   <p:notesMasterIdLst>
-    <p:notesMasterId r:id="rId5"/>
+    <p:notesMasterId r:id="rId7"/>
   </p:notesMasterIdLst>
   <p:sldIdLst>
     <p:sldId id="256" r:id="rId2"/>
     <p:sldId id="257" r:id="rId3"/>
     <p:sldId id="258" r:id="rId4"/>
+    <p:sldId id="259" r:id="rId5"/>
+    <p:sldId id="260" r:id="rId6"/>
   </p:sldIdLst>
   <p:sldSz cx="9144000" cy="6858000" type="screen4x3"/>
   <p:notesSz cx="6858000" cy="9144000"/>
@@ -194,7 +196,7 @@
           <a:p>
             <a:fld id="{1EAC2CEE-5F46-5F4D-A743-2326851CE533}" type="datetimeFigureOut">
               <a:rPr lang="en-US" smtClean="0"/>
-              <a:t>4/2/17</a:t>
+              <a:t>4/6/17</a:t>
             </a:fld>
             <a:endParaRPr lang="en-US"/>
           </a:p>
@@ -819,7 +821,7 @@
           <a:p>
             <a:fld id="{85257AAD-97C7-8E4A-AE15-4CB2A0965900}" type="datetimeFigureOut">
               <a:rPr lang="en-US" smtClean="0"/>
-              <a:t>4/2/17</a:t>
+              <a:t>4/6/17</a:t>
             </a:fld>
             <a:endParaRPr lang="en-US"/>
           </a:p>
@@ -989,7 +991,7 @@
           <a:p>
             <a:fld id="{85257AAD-97C7-8E4A-AE15-4CB2A0965900}" type="datetimeFigureOut">
               <a:rPr lang="en-US" smtClean="0"/>
-              <a:t>4/2/17</a:t>
+              <a:t>4/6/17</a:t>
             </a:fld>
             <a:endParaRPr lang="en-US"/>
           </a:p>
@@ -1169,7 +1171,7 @@
           <a:p>
             <a:fld id="{85257AAD-97C7-8E4A-AE15-4CB2A0965900}" type="datetimeFigureOut">
               <a:rPr lang="en-US" smtClean="0"/>
-              <a:t>4/2/17</a:t>
+              <a:t>4/6/17</a:t>
             </a:fld>
             <a:endParaRPr lang="en-US"/>
           </a:p>
@@ -1339,7 +1341,7 @@
           <a:p>
             <a:fld id="{85257AAD-97C7-8E4A-AE15-4CB2A0965900}" type="datetimeFigureOut">
               <a:rPr lang="en-US" smtClean="0"/>
-              <a:t>4/2/17</a:t>
+              <a:t>4/6/17</a:t>
             </a:fld>
             <a:endParaRPr lang="en-US"/>
           </a:p>
@@ -1585,7 +1587,7 @@
           <a:p>
             <a:fld id="{85257AAD-97C7-8E4A-AE15-4CB2A0965900}" type="datetimeFigureOut">
               <a:rPr lang="en-US" smtClean="0"/>
-              <a:t>4/2/17</a:t>
+              <a:t>4/6/17</a:t>
             </a:fld>
             <a:endParaRPr lang="en-US"/>
           </a:p>
@@ -1873,7 +1875,7 @@
           <a:p>
             <a:fld id="{85257AAD-97C7-8E4A-AE15-4CB2A0965900}" type="datetimeFigureOut">
               <a:rPr lang="en-US" smtClean="0"/>
-              <a:t>4/2/17</a:t>
+              <a:t>4/6/17</a:t>
             </a:fld>
             <a:endParaRPr lang="en-US"/>
           </a:p>
@@ -2295,7 +2297,7 @@
           <a:p>
             <a:fld id="{85257AAD-97C7-8E4A-AE15-4CB2A0965900}" type="datetimeFigureOut">
               <a:rPr lang="en-US" smtClean="0"/>
-              <a:t>4/2/17</a:t>
+              <a:t>4/6/17</a:t>
             </a:fld>
             <a:endParaRPr lang="en-US"/>
           </a:p>
@@ -2413,7 +2415,7 @@
           <a:p>
             <a:fld id="{85257AAD-97C7-8E4A-AE15-4CB2A0965900}" type="datetimeFigureOut">
               <a:rPr lang="en-US" smtClean="0"/>
-              <a:t>4/2/17</a:t>
+              <a:t>4/6/17</a:t>
             </a:fld>
             <a:endParaRPr lang="en-US"/>
           </a:p>
@@ -2508,7 +2510,7 @@
           <a:p>
             <a:fld id="{85257AAD-97C7-8E4A-AE15-4CB2A0965900}" type="datetimeFigureOut">
               <a:rPr lang="en-US" smtClean="0"/>
-              <a:t>4/2/17</a:t>
+              <a:t>4/6/17</a:t>
             </a:fld>
             <a:endParaRPr lang="en-US"/>
           </a:p>
@@ -2785,7 +2787,7 @@
           <a:p>
             <a:fld id="{85257AAD-97C7-8E4A-AE15-4CB2A0965900}" type="datetimeFigureOut">
               <a:rPr lang="en-US" smtClean="0"/>
-              <a:t>4/2/17</a:t>
+              <a:t>4/6/17</a:t>
             </a:fld>
             <a:endParaRPr lang="en-US"/>
           </a:p>
@@ -3038,7 +3040,7 @@
           <a:p>
             <a:fld id="{85257AAD-97C7-8E4A-AE15-4CB2A0965900}" type="datetimeFigureOut">
               <a:rPr lang="en-US" smtClean="0"/>
-              <a:t>4/2/17</a:t>
+              <a:t>4/6/17</a:t>
             </a:fld>
             <a:endParaRPr lang="en-US"/>
           </a:p>
@@ -3251,7 +3253,7 @@
           <a:p>
             <a:fld id="{85257AAD-97C7-8E4A-AE15-4CB2A0965900}" type="datetimeFigureOut">
               <a:rPr lang="en-US" smtClean="0"/>
-              <a:t>4/2/17</a:t>
+              <a:t>4/6/17</a:t>
             </a:fld>
             <a:endParaRPr lang="en-US"/>
           </a:p>
@@ -5874,31 +5876,7 @@
           <a:p>
             <a:r>
               <a:rPr lang="en-US" dirty="0" smtClean="0"/>
-              <a:t>1.5</a:t>
-            </a:r>
-            <a:r>
-              <a:rPr lang="en-US" dirty="0" smtClean="0"/>
-              <a:t> </a:t>
-            </a:r>
-            <a:r>
-              <a:rPr lang="en-US" dirty="0" smtClean="0"/>
-              <a:t>Rotor Diameters </a:t>
-            </a:r>
-            <a:r>
-              <a:rPr lang="en-US" dirty="0" smtClean="0"/>
-              <a:t>(</a:t>
-            </a:r>
-            <a:r>
-              <a:rPr lang="en-US" dirty="0" smtClean="0"/>
-              <a:t>189</a:t>
-            </a:r>
-            <a:r>
-              <a:rPr lang="en-US" dirty="0" smtClean="0"/>
-              <a:t> </a:t>
-            </a:r>
-            <a:r>
-              <a:rPr lang="en-US" dirty="0" smtClean="0"/>
-              <a:t>m)</a:t>
+              <a:t>1.5 Rotor Diameters (189 m)</a:t>
             </a:r>
             <a:endParaRPr lang="en-US" dirty="0"/>
           </a:p>
@@ -5995,6 +5973,442 @@
       </p:par>
     </p:tnLst>
   </p:timing>
+</p:sld>
+</file>
+
+<file path=ppt/slides/slide4.xml><?xml version="1.0" encoding="utf-8"?>
+<p:sld xmlns:a="http://schemas.openxmlformats.org/drawingml/2006/main" xmlns:r="http://schemas.openxmlformats.org/officeDocument/2006/relationships" xmlns:p="http://schemas.openxmlformats.org/presentationml/2006/main">
+  <p:cSld>
+    <p:spTree>
+      <p:nvGrpSpPr>
+        <p:cNvPr id="1" name=""/>
+        <p:cNvGrpSpPr/>
+        <p:nvPr/>
+      </p:nvGrpSpPr>
+      <p:grpSpPr>
+        <a:xfrm>
+          <a:off x="0" y="0"/>
+          <a:ext cx="0" cy="0"/>
+          <a:chOff x="0" y="0"/>
+          <a:chExt cx="0" cy="0"/>
+        </a:xfrm>
+      </p:grpSpPr>
+      <p:sp>
+        <p:nvSpPr>
+          <p:cNvPr id="2" name="Title 1"/>
+          <p:cNvSpPr>
+            <a:spLocks noGrp="1"/>
+          </p:cNvSpPr>
+          <p:nvPr>
+            <p:ph type="title"/>
+          </p:nvPr>
+        </p:nvSpPr>
+        <p:spPr/>
+        <p:txBody>
+          <a:bodyPr/>
+          <a:lstStyle/>
+          <a:p>
+            <a:endParaRPr lang="en-US"/>
+          </a:p>
+        </p:txBody>
+      </p:sp>
+      <p:sp>
+        <p:nvSpPr>
+          <p:cNvPr id="3" name="Content Placeholder 2"/>
+          <p:cNvSpPr>
+            <a:spLocks noGrp="1"/>
+          </p:cNvSpPr>
+          <p:nvPr>
+            <p:ph idx="1"/>
+          </p:nvPr>
+        </p:nvSpPr>
+        <p:spPr/>
+        <p:txBody>
+          <a:bodyPr/>
+          <a:lstStyle/>
+          <a:p>
+            <a:endParaRPr lang="en-US" dirty="0"/>
+          </a:p>
+        </p:txBody>
+      </p:sp>
+      <p:pic>
+        <p:nvPicPr>
+          <p:cNvPr id="4" name="Picture 3" descr="StretchGust_coarse.png"/>
+          <p:cNvPicPr>
+            <a:picLocks noChangeAspect="1"/>
+          </p:cNvPicPr>
+          <p:nvPr/>
+        </p:nvPicPr>
+        <p:blipFill>
+          <a:blip r:embed="rId2">
+            <a:extLst>
+              <a:ext uri="{28A0092B-C50C-407E-A947-70E740481C1C}">
+                <a14:useLocalDpi xmlns:a14="http://schemas.microsoft.com/office/drawing/2010/main" val="0"/>
+              </a:ext>
+            </a:extLst>
+          </a:blip>
+          <a:stretch>
+            <a:fillRect/>
+          </a:stretch>
+        </p:blipFill>
+        <p:spPr>
+          <a:xfrm>
+            <a:off x="0" y="1776699"/>
+            <a:ext cx="9144000" cy="5081301"/>
+          </a:xfrm>
+          <a:prstGeom prst="rect">
+            <a:avLst/>
+          </a:prstGeom>
+        </p:spPr>
+      </p:pic>
+      <p:sp>
+        <p:nvSpPr>
+          <p:cNvPr id="5" name="Oval 4"/>
+          <p:cNvSpPr/>
+          <p:nvPr/>
+        </p:nvSpPr>
+        <p:spPr>
+          <a:xfrm>
+            <a:off x="4727575" y="3949700"/>
+            <a:ext cx="755650" cy="742950"/>
+          </a:xfrm>
+          <a:prstGeom prst="ellipse">
+            <a:avLst/>
+          </a:prstGeom>
+          <a:noFill/>
+          <a:ln w="6350" cmpd="sng">
+            <a:solidFill>
+              <a:schemeClr val="bg1"/>
+            </a:solidFill>
+          </a:ln>
+        </p:spPr>
+        <p:style>
+          <a:lnRef idx="1">
+            <a:schemeClr val="accent1"/>
+          </a:lnRef>
+          <a:fillRef idx="3">
+            <a:schemeClr val="accent1"/>
+          </a:fillRef>
+          <a:effectRef idx="2">
+            <a:schemeClr val="accent1"/>
+          </a:effectRef>
+          <a:fontRef idx="minor">
+            <a:schemeClr val="lt1"/>
+          </a:fontRef>
+        </p:style>
+        <p:txBody>
+          <a:bodyPr rtlCol="0" anchor="ctr"/>
+          <a:lstStyle/>
+          <a:p>
+            <a:pPr algn="ctr"/>
+            <a:endParaRPr lang="en-US"/>
+          </a:p>
+        </p:txBody>
+      </p:sp>
+      <p:sp>
+        <p:nvSpPr>
+          <p:cNvPr id="6" name="Oval 5"/>
+          <p:cNvSpPr/>
+          <p:nvPr/>
+        </p:nvSpPr>
+        <p:spPr>
+          <a:xfrm>
+            <a:off x="3660775" y="3949700"/>
+            <a:ext cx="755650" cy="742950"/>
+          </a:xfrm>
+          <a:prstGeom prst="ellipse">
+            <a:avLst/>
+          </a:prstGeom>
+          <a:noFill/>
+          <a:ln w="6350" cmpd="sng">
+            <a:solidFill>
+              <a:schemeClr val="bg1"/>
+            </a:solidFill>
+          </a:ln>
+        </p:spPr>
+        <p:style>
+          <a:lnRef idx="1">
+            <a:schemeClr val="accent1"/>
+          </a:lnRef>
+          <a:fillRef idx="3">
+            <a:schemeClr val="accent1"/>
+          </a:fillRef>
+          <a:effectRef idx="2">
+            <a:schemeClr val="accent1"/>
+          </a:effectRef>
+          <a:fontRef idx="minor">
+            <a:schemeClr val="lt1"/>
+          </a:fontRef>
+        </p:style>
+        <p:txBody>
+          <a:bodyPr rtlCol="0" anchor="ctr"/>
+          <a:lstStyle/>
+          <a:p>
+            <a:pPr algn="ctr"/>
+            <a:endParaRPr lang="en-US"/>
+          </a:p>
+        </p:txBody>
+      </p:sp>
+      <p:cxnSp>
+        <p:nvCxnSpPr>
+          <p:cNvPr id="8" name="Straight Arrow Connector 7"/>
+          <p:cNvCxnSpPr/>
+          <p:nvPr/>
+        </p:nvCxnSpPr>
+        <p:spPr>
+          <a:xfrm flipV="1">
+            <a:off x="1549400" y="2165350"/>
+            <a:ext cx="0" cy="1568450"/>
+          </a:xfrm>
+          <a:prstGeom prst="straightConnector1">
+            <a:avLst/>
+          </a:prstGeom>
+          <a:ln>
+            <a:solidFill>
+              <a:schemeClr val="tx1"/>
+            </a:solidFill>
+            <a:tailEnd type="arrow"/>
+          </a:ln>
+          <a:effectLst/>
+        </p:spPr>
+        <p:style>
+          <a:lnRef idx="2">
+            <a:schemeClr val="accent1"/>
+          </a:lnRef>
+          <a:fillRef idx="0">
+            <a:schemeClr val="accent1"/>
+          </a:fillRef>
+          <a:effectRef idx="1">
+            <a:schemeClr val="accent1"/>
+          </a:effectRef>
+          <a:fontRef idx="minor">
+            <a:schemeClr val="tx1"/>
+          </a:fontRef>
+        </p:style>
+      </p:cxnSp>
+      <p:cxnSp>
+        <p:nvCxnSpPr>
+          <p:cNvPr id="13" name="Straight Connector 12"/>
+          <p:cNvCxnSpPr/>
+          <p:nvPr/>
+        </p:nvCxnSpPr>
+        <p:spPr>
+          <a:xfrm flipH="1">
+            <a:off x="1441450" y="2152650"/>
+            <a:ext cx="203200" cy="0"/>
+          </a:xfrm>
+          <a:prstGeom prst="line">
+            <a:avLst/>
+          </a:prstGeom>
+          <a:ln>
+            <a:solidFill>
+              <a:schemeClr val="tx1"/>
+            </a:solidFill>
+          </a:ln>
+          <a:effectLst/>
+        </p:spPr>
+        <p:style>
+          <a:lnRef idx="2">
+            <a:schemeClr val="accent1"/>
+          </a:lnRef>
+          <a:fillRef idx="0">
+            <a:schemeClr val="accent1"/>
+          </a:fillRef>
+          <a:effectRef idx="1">
+            <a:schemeClr val="accent1"/>
+          </a:effectRef>
+          <a:fontRef idx="minor">
+            <a:schemeClr val="tx1"/>
+          </a:fontRef>
+        </p:style>
+      </p:cxnSp>
+      <p:cxnSp>
+        <p:nvCxnSpPr>
+          <p:cNvPr id="14" name="Straight Connector 13"/>
+          <p:cNvCxnSpPr/>
+          <p:nvPr/>
+        </p:nvCxnSpPr>
+        <p:spPr>
+          <a:xfrm flipH="1">
+            <a:off x="1384300" y="6032500"/>
+            <a:ext cx="203200" cy="0"/>
+          </a:xfrm>
+          <a:prstGeom prst="line">
+            <a:avLst/>
+          </a:prstGeom>
+          <a:ln>
+            <a:solidFill>
+              <a:schemeClr val="tx1"/>
+            </a:solidFill>
+          </a:ln>
+          <a:effectLst/>
+        </p:spPr>
+        <p:style>
+          <a:lnRef idx="2">
+            <a:schemeClr val="accent1"/>
+          </a:lnRef>
+          <a:fillRef idx="0">
+            <a:schemeClr val="accent1"/>
+          </a:fillRef>
+          <a:effectRef idx="1">
+            <a:schemeClr val="accent1"/>
+          </a:effectRef>
+          <a:fontRef idx="minor">
+            <a:schemeClr val="tx1"/>
+          </a:fontRef>
+        </p:style>
+      </p:cxnSp>
+      <p:cxnSp>
+        <p:nvCxnSpPr>
+          <p:cNvPr id="15" name="Straight Connector 14"/>
+          <p:cNvCxnSpPr/>
+          <p:nvPr/>
+        </p:nvCxnSpPr>
+        <p:spPr>
+          <a:xfrm flipH="1">
+            <a:off x="3457575" y="5949950"/>
+            <a:ext cx="203200" cy="0"/>
+          </a:xfrm>
+          <a:prstGeom prst="line">
+            <a:avLst/>
+          </a:prstGeom>
+          <a:ln>
+            <a:solidFill>
+              <a:schemeClr val="tx1"/>
+            </a:solidFill>
+          </a:ln>
+          <a:effectLst/>
+        </p:spPr>
+        <p:style>
+          <a:lnRef idx="2">
+            <a:schemeClr val="accent1"/>
+          </a:lnRef>
+          <a:fillRef idx="0">
+            <a:schemeClr val="accent1"/>
+          </a:fillRef>
+          <a:effectRef idx="1">
+            <a:schemeClr val="accent1"/>
+          </a:effectRef>
+          <a:fontRef idx="minor">
+            <a:schemeClr val="tx1"/>
+          </a:fontRef>
+        </p:style>
+      </p:cxnSp>
+    </p:spTree>
+    <p:extLst>
+      <p:ext uri="{BB962C8B-B14F-4D97-AF65-F5344CB8AC3E}">
+        <p14:creationId xmlns:p14="http://schemas.microsoft.com/office/powerpoint/2010/main" val="4151144727"/>
+      </p:ext>
+    </p:extLst>
+  </p:cSld>
+  <p:clrMapOvr>
+    <a:masterClrMapping/>
+  </p:clrMapOvr>
+  <p:timing>
+    <p:tnLst>
+      <p:par>
+        <p:cTn xmlns:p14="http://schemas.microsoft.com/office/powerpoint/2010/main" id="1" dur="indefinite" restart="never" nodeType="tmRoot"/>
+      </p:par>
+    </p:tnLst>
+  </p:timing>
+</p:sld>
+</file>
+
+<file path=ppt/slides/slide5.xml><?xml version="1.0" encoding="utf-8"?>
+<p:sld xmlns:a="http://schemas.openxmlformats.org/drawingml/2006/main" xmlns:r="http://schemas.openxmlformats.org/officeDocument/2006/relationships" xmlns:p="http://schemas.openxmlformats.org/presentationml/2006/main">
+  <p:cSld>
+    <p:spTree>
+      <p:nvGrpSpPr>
+        <p:cNvPr id="1" name=""/>
+        <p:cNvGrpSpPr/>
+        <p:nvPr/>
+      </p:nvGrpSpPr>
+      <p:grpSpPr>
+        <a:xfrm>
+          <a:off x="0" y="0"/>
+          <a:ext cx="0" cy="0"/>
+          <a:chOff x="0" y="0"/>
+          <a:chExt cx="0" cy="0"/>
+        </a:xfrm>
+      </p:grpSpPr>
+      <p:sp>
+        <p:nvSpPr>
+          <p:cNvPr id="2" name="Title 1"/>
+          <p:cNvSpPr>
+            <a:spLocks noGrp="1"/>
+          </p:cNvSpPr>
+          <p:nvPr>
+            <p:ph type="title"/>
+          </p:nvPr>
+        </p:nvSpPr>
+        <p:spPr/>
+        <p:txBody>
+          <a:bodyPr/>
+          <a:lstStyle/>
+          <a:p>
+            <a:endParaRPr lang="en-US"/>
+          </a:p>
+        </p:txBody>
+      </p:sp>
+      <p:sp>
+        <p:nvSpPr>
+          <p:cNvPr id="3" name="Content Placeholder 2"/>
+          <p:cNvSpPr>
+            <a:spLocks noGrp="1"/>
+          </p:cNvSpPr>
+          <p:nvPr>
+            <p:ph idx="1"/>
+          </p:nvPr>
+        </p:nvSpPr>
+        <p:spPr/>
+        <p:txBody>
+          <a:bodyPr/>
+          <a:lstStyle/>
+          <a:p>
+            <a:endParaRPr lang="en-US"/>
+          </a:p>
+        </p:txBody>
+      </p:sp>
+      <p:pic>
+        <p:nvPicPr>
+          <p:cNvPr id="4" name="Picture 3" descr="CosGust_coarse.png"/>
+          <p:cNvPicPr>
+            <a:picLocks noChangeAspect="1"/>
+          </p:cNvPicPr>
+          <p:nvPr/>
+        </p:nvPicPr>
+        <p:blipFill>
+          <a:blip r:embed="rId2">
+            <a:extLst>
+              <a:ext uri="{28A0092B-C50C-407E-A947-70E740481C1C}">
+                <a14:useLocalDpi xmlns:a14="http://schemas.microsoft.com/office/drawing/2010/main" val="0"/>
+              </a:ext>
+            </a:extLst>
+          </a:blip>
+          <a:stretch>
+            <a:fillRect/>
+          </a:stretch>
+        </p:blipFill>
+        <p:spPr>
+          <a:xfrm>
+            <a:off x="0" y="1776699"/>
+            <a:ext cx="9144000" cy="5081301"/>
+          </a:xfrm>
+          <a:prstGeom prst="rect">
+            <a:avLst/>
+          </a:prstGeom>
+        </p:spPr>
+      </p:pic>
+    </p:spTree>
+    <p:extLst>
+      <p:ext uri="{BB962C8B-B14F-4D97-AF65-F5344CB8AC3E}">
+        <p14:creationId xmlns:p14="http://schemas.microsoft.com/office/powerpoint/2010/main" val="969188429"/>
+      </p:ext>
+    </p:extLst>
+  </p:cSld>
+  <p:clrMapOvr>
+    <a:masterClrMapping/>
+  </p:clrMapOvr>
 </p:sld>
 </file>
 

</xml_diff>